<commit_message>
added github repo links as references.
</commit_message>
<xml_diff>
--- a/src/Alexa ppt.pptx
+++ b/src/Alexa ppt.pptx
@@ -7881,7 +7881,12 @@
             <p:ph type="title"/>
           </p:nvPr>
         </p:nvSpPr>
-        <p:spPr/>
+        <p:spPr>
+          <a:xfrm>
+            <a:off x="646111" y="415648"/>
+            <a:ext cx="9404723" cy="1400530"/>
+          </a:xfrm>
+        </p:spPr>
         <p:txBody>
           <a:bodyPr/>
           <a:lstStyle/>
@@ -7927,10 +7932,16 @@
               <a:buChar char="Ø"/>
             </a:pPr>
             <a:r>
+              <a:rPr lang="en-US" sz="2800" dirty="0">
+                <a:hlinkClick r:id="rId2"/>
+              </a:rPr>
+              <a:t>https://</a:t>
+            </a:r>
+            <a:r>
               <a:rPr lang="en-US" sz="2800" dirty="0" smtClean="0">
                 <a:hlinkClick r:id="rId2"/>
               </a:rPr>
-              <a:t>https://developer.amazon.com/alexa</a:t>
+              <a:t>github.com/profcase/skill-bearcat-buddy</a:t>
             </a:r>
             <a:endParaRPr lang="en-US" sz="2800" dirty="0" smtClean="0"/>
           </a:p>
@@ -7940,12 +7951,14 @@
               <a:buChar char="Ø"/>
             </a:pPr>
             <a:r>
-              <a:rPr lang="en-US" sz="2800" dirty="0" smtClean="0">
+              <a:rPr lang="en-US" sz="2800">
                 <a:hlinkClick r:id="rId3"/>
               </a:rPr>
-              <a:t>https://aws.amazon.com</a:t>
-            </a:r>
-            <a:endParaRPr lang="en-US" sz="2800" dirty="0" smtClean="0"/>
+              <a:t>https://github.com/blondiebits/code-in-5</a:t>
+            </a:r>
+            <a:endParaRPr lang="en-US" sz="2800" dirty="0" smtClean="0">
+              <a:hlinkClick r:id="rId4"/>
+            </a:endParaRPr>
           </a:p>
           <a:p>
             <a:pPr>
@@ -7953,16 +7966,16 @@
               <a:buChar char="Ø"/>
             </a:pPr>
             <a:r>
-              <a:rPr lang="en-US" sz="2800" dirty="0">
-                <a:hlinkClick r:id="rId4"/>
-              </a:rPr>
-              <a:t>https://</a:t>
-            </a:r>
-            <a:r>
               <a:rPr lang="en-US" sz="2800" dirty="0" smtClean="0">
                 <a:hlinkClick r:id="rId4"/>
               </a:rPr>
-              <a:t>en.wikipedia.org/wiki/Amazon_Alexa</a:t>
+              <a:t>https</a:t>
+            </a:r>
+            <a:r>
+              <a:rPr lang="en-US" sz="2800" dirty="0" smtClean="0">
+                <a:hlinkClick r:id="rId4"/>
+              </a:rPr>
+              <a:t>://developer.amazon.com/alexa</a:t>
             </a:r>
             <a:endParaRPr lang="en-US" sz="2800" dirty="0" smtClean="0"/>
           </a:p>
@@ -7972,16 +7985,10 @@
               <a:buChar char="Ø"/>
             </a:pPr>
             <a:r>
-              <a:rPr lang="en-US" sz="2800" dirty="0">
-                <a:hlinkClick r:id="rId5"/>
-              </a:rPr>
-              <a:t>https://</a:t>
-            </a:r>
-            <a:r>
               <a:rPr lang="en-US" sz="2800" dirty="0" smtClean="0">
                 <a:hlinkClick r:id="rId5"/>
               </a:rPr>
-              <a:t>www.youtube.com/watch?v=d12DhlFVERc</a:t>
+              <a:t>https://aws.amazon.com</a:t>
             </a:r>
             <a:endParaRPr lang="en-US" sz="2800" dirty="0" smtClean="0"/>
           </a:p>
@@ -7993,6 +8000,44 @@
             <a:r>
               <a:rPr lang="en-US" sz="2800" dirty="0">
                 <a:hlinkClick r:id="rId6"/>
+              </a:rPr>
+              <a:t>https://</a:t>
+            </a:r>
+            <a:r>
+              <a:rPr lang="en-US" sz="2800" dirty="0" smtClean="0">
+                <a:hlinkClick r:id="rId6"/>
+              </a:rPr>
+              <a:t>en.wikipedia.org/wiki/Amazon_Alexa</a:t>
+            </a:r>
+            <a:endParaRPr lang="en-US" sz="2800" dirty="0" smtClean="0"/>
+          </a:p>
+          <a:p>
+            <a:pPr>
+              <a:buFont typeface="Wingdings" panose="05000000000000000000" pitchFamily="2" charset="2"/>
+              <a:buChar char="Ø"/>
+            </a:pPr>
+            <a:r>
+              <a:rPr lang="en-US" sz="2800" dirty="0">
+                <a:hlinkClick r:id="rId7"/>
+              </a:rPr>
+              <a:t>https://</a:t>
+            </a:r>
+            <a:r>
+              <a:rPr lang="en-US" sz="2800" dirty="0" smtClean="0">
+                <a:hlinkClick r:id="rId7"/>
+              </a:rPr>
+              <a:t>www.youtube.com/watch?v=d12DhlFVERc</a:t>
+            </a:r>
+            <a:endParaRPr lang="en-US" sz="2800" dirty="0" smtClean="0"/>
+          </a:p>
+          <a:p>
+            <a:pPr>
+              <a:buFont typeface="Wingdings" panose="05000000000000000000" pitchFamily="2" charset="2"/>
+              <a:buChar char="Ø"/>
+            </a:pPr>
+            <a:r>
+              <a:rPr lang="en-US" sz="2800" dirty="0">
+                <a:hlinkClick r:id="rId8"/>
               </a:rPr>
               <a:t>https://www.youtube.com/watch?v=5zsKViLKhi0</a:t>
             </a:r>
@@ -8199,15 +8244,7 @@
                   <a:srgbClr val="FFFF00"/>
                 </a:solidFill>
               </a:rPr>
-              <a:t>amarpitha</a:t>
-            </a:r>
-            <a:r>
-              <a:rPr lang="en-US" dirty="0" smtClean="0">
-                <a:solidFill>
-                  <a:srgbClr val="FFFF00"/>
-                </a:solidFill>
-              </a:rPr>
-              <a:t> </a:t>
+              <a:t>amarpitha </a:t>
             </a:r>
             <a:r>
               <a:rPr lang="en-US" dirty="0">
@@ -8235,23 +8272,7 @@
                   <a:srgbClr val="FFFF00"/>
                 </a:solidFill>
               </a:rPr>
-              <a:t>Alekhya</a:t>
-            </a:r>
-            <a:r>
-              <a:rPr lang="en-US" dirty="0" smtClean="0">
-                <a:solidFill>
-                  <a:srgbClr val="FFFF00"/>
-                </a:solidFill>
-              </a:rPr>
-              <a:t>  </a:t>
-            </a:r>
-            <a:r>
-              <a:rPr lang="en-US" dirty="0" smtClean="0">
-                <a:solidFill>
-                  <a:srgbClr val="FFFF00"/>
-                </a:solidFill>
-              </a:rPr>
-              <a:t>Jaddu</a:t>
+              <a:t>Alekhya  Jaddu</a:t>
             </a:r>
             <a:endParaRPr lang="en-US" dirty="0">
               <a:solidFill>
@@ -8317,11 +8338,7 @@
             </a:r>
             <a:r>
               <a:rPr lang="en-US" dirty="0" smtClean="0"/>
-              <a:t>                                                                      </a:t>
-            </a:r>
-            <a:r>
-              <a:rPr lang="en-US" dirty="0" smtClean="0"/>
-              <a:t>  </a:t>
+              <a:t>                                                                        </a:t>
             </a:r>
             <a:r>
               <a:rPr lang="en-US" dirty="0" smtClean="0">
@@ -8329,29 +8346,8 @@
                   <a:srgbClr val="FFFF00"/>
                 </a:solidFill>
               </a:rPr>
-              <a:t>Sushma</a:t>
-            </a:r>
-            <a:r>
-              <a:rPr lang="en-US" dirty="0" smtClean="0">
-                <a:solidFill>
-                  <a:srgbClr val="FFFF00"/>
-                </a:solidFill>
-              </a:rPr>
-              <a:t> </a:t>
-            </a:r>
-            <a:r>
-              <a:rPr lang="en-US" dirty="0" smtClean="0">
-                <a:solidFill>
-                  <a:srgbClr val="FFFF00"/>
-                </a:solidFill>
-              </a:rPr>
-              <a:t>Chanati</a:t>
-            </a:r>
-            <a:endParaRPr lang="en-US" dirty="0" smtClean="0">
-              <a:solidFill>
-                <a:srgbClr val="FFFF00"/>
-              </a:solidFill>
-            </a:endParaRPr>
+              <a:t>Sushma Chanati</a:t>
+            </a:r>
           </a:p>
           <a:p>
             <a:pPr marL="0" indent="0">
@@ -8656,23 +8652,7 @@
                   <a:srgbClr val="92D050"/>
                 </a:solidFill>
               </a:rPr>
-              <a:t>Alexa </a:t>
-            </a:r>
-            <a:r>
-              <a:rPr lang="en-US" sz="3200" dirty="0" smtClean="0">
-                <a:solidFill>
-                  <a:srgbClr val="92D050"/>
-                </a:solidFill>
-              </a:rPr>
-              <a:t>Skills Kit (ASK</a:t>
-            </a:r>
-            <a:r>
-              <a:rPr lang="en-US" sz="3200" dirty="0" smtClean="0">
-                <a:solidFill>
-                  <a:srgbClr val="92D050"/>
-                </a:solidFill>
-              </a:rPr>
-              <a:t>)</a:t>
+              <a:t>Alexa Skills Kit (ASK)</a:t>
             </a:r>
           </a:p>
           <a:p>
@@ -8696,11 +8676,6 @@
               </a:rPr>
               <a:t>?</a:t>
             </a:r>
-            <a:endParaRPr lang="en-US" sz="3200" dirty="0" smtClean="0">
-              <a:solidFill>
-                <a:srgbClr val="92D050"/>
-              </a:solidFill>
-            </a:endParaRPr>
           </a:p>
           <a:p>
             <a:pPr>
@@ -8715,11 +8690,6 @@
               </a:rPr>
               <a:t>AWS Lambda</a:t>
             </a:r>
-            <a:endParaRPr lang="en-US" sz="3200" dirty="0" smtClean="0">
-              <a:solidFill>
-                <a:srgbClr val="92D050"/>
-              </a:solidFill>
-            </a:endParaRPr>
           </a:p>
           <a:p>
             <a:pPr>
@@ -8762,11 +8732,6 @@
               </a:rPr>
               <a:t>Amazon Echo</a:t>
             </a:r>
-            <a:endParaRPr lang="en-US" sz="3200" dirty="0" smtClean="0">
-              <a:solidFill>
-                <a:srgbClr val="92D050"/>
-              </a:solidFill>
-            </a:endParaRPr>
           </a:p>
           <a:p>
             <a:pPr>
@@ -8879,11 +8844,6 @@
               </a:rPr>
               <a:t>Sushma</a:t>
             </a:r>
-            <a:endParaRPr lang="en-US" dirty="0" smtClean="0">
-              <a:solidFill>
-                <a:srgbClr val="FFC000"/>
-              </a:solidFill>
-            </a:endParaRPr>
           </a:p>
         </p:txBody>
       </p:sp>
@@ -9080,11 +9040,6 @@
               </a:rPr>
               <a:t>Sushma</a:t>
             </a:r>
-            <a:endParaRPr lang="en-US" dirty="0">
-              <a:solidFill>
-                <a:srgbClr val="FFC000"/>
-              </a:solidFill>
-            </a:endParaRPr>
           </a:p>
           <a:p>
             <a:endParaRPr lang="en-US" dirty="0"/>
@@ -9142,15 +9097,7 @@
                   <a:srgbClr val="00B0F0"/>
                 </a:solidFill>
               </a:rPr>
-              <a:t>Amazon </a:t>
-            </a:r>
-            <a:r>
-              <a:rPr lang="en-US" dirty="0" smtClean="0">
-                <a:solidFill>
-                  <a:srgbClr val="00B0F0"/>
-                </a:solidFill>
-              </a:rPr>
-              <a:t>Alexa</a:t>
+              <a:t>Amazon Alexa</a:t>
             </a:r>
             <a:endParaRPr lang="en-US" dirty="0">
               <a:solidFill>
@@ -9385,7 +9332,6 @@
               <a:rPr lang="en-US" dirty="0" smtClean="0"/>
               <a:t>Intelligence.</a:t>
             </a:r>
-            <a:endParaRPr lang="en-US" dirty="0" smtClean="0"/>
           </a:p>
           <a:p>
             <a:r>
@@ -9420,13 +9366,8 @@
           <a:p>
             <a:r>
               <a:rPr lang="en-US" dirty="0" smtClean="0"/>
-              <a:t>We are controlling everything via virtual assistants instead through </a:t>
-            </a:r>
-            <a:r>
-              <a:rPr lang="en-US" dirty="0" smtClean="0"/>
-              <a:t>apps.</a:t>
-            </a:r>
-            <a:endParaRPr lang="en-US" dirty="0" smtClean="0"/>
+              <a:t>We are controlling everything via virtual assistants instead through apps.</a:t>
+            </a:r>
           </a:p>
           <a:p>
             <a:endParaRPr lang="en-US" dirty="0"/>

</xml_diff>